<commit_message>
- Removed BlinkStickDotNet.dll dependency : BlinkStick Unity implementation now only depends on HidLibrary.dll
</commit_message>
<xml_diff>
--- a/Doc/BlinkStick_Doc.pptx
+++ b/Doc/BlinkStick_Doc.pptx
@@ -104,6 +104,11 @@
       </a:defRPr>
     </a:lvl9pPr>
   </p:defaultTextStyle>
+  <p:extLst>
+    <p:ext uri="{EFAFB233-063F-42B5-8137-9DF3F51BA10A}">
+      <p15:sldGuideLst xmlns:p15="http://schemas.microsoft.com/office/powerpoint/2012/main"/>
+    </p:ext>
+  </p:extLst>
 </p:presentation>
 </file>
 
@@ -238,7 +243,7 @@
           <a:p>
             <a:fld id="{3251C5E9-4D7C-4F7F-8F09-6DF95D3E91D1}" type="datetimeFigureOut">
               <a:rPr lang="fr-FR" smtClean="0"/>
-              <a:t>09/04/2021</a:t>
+              <a:t>12/04/2021</a:t>
             </a:fld>
             <a:endParaRPr lang="fr-FR"/>
           </a:p>
@@ -408,7 +413,7 @@
           <a:p>
             <a:fld id="{3251C5E9-4D7C-4F7F-8F09-6DF95D3E91D1}" type="datetimeFigureOut">
               <a:rPr lang="fr-FR" smtClean="0"/>
-              <a:t>09/04/2021</a:t>
+              <a:t>12/04/2021</a:t>
             </a:fld>
             <a:endParaRPr lang="fr-FR"/>
           </a:p>
@@ -588,7 +593,7 @@
           <a:p>
             <a:fld id="{3251C5E9-4D7C-4F7F-8F09-6DF95D3E91D1}" type="datetimeFigureOut">
               <a:rPr lang="fr-FR" smtClean="0"/>
-              <a:t>09/04/2021</a:t>
+              <a:t>12/04/2021</a:t>
             </a:fld>
             <a:endParaRPr lang="fr-FR"/>
           </a:p>
@@ -758,7 +763,7 @@
           <a:p>
             <a:fld id="{3251C5E9-4D7C-4F7F-8F09-6DF95D3E91D1}" type="datetimeFigureOut">
               <a:rPr lang="fr-FR" smtClean="0"/>
-              <a:t>09/04/2021</a:t>
+              <a:t>12/04/2021</a:t>
             </a:fld>
             <a:endParaRPr lang="fr-FR"/>
           </a:p>
@@ -1004,7 +1009,7 @@
           <a:p>
             <a:fld id="{3251C5E9-4D7C-4F7F-8F09-6DF95D3E91D1}" type="datetimeFigureOut">
               <a:rPr lang="fr-FR" smtClean="0"/>
-              <a:t>09/04/2021</a:t>
+              <a:t>12/04/2021</a:t>
             </a:fld>
             <a:endParaRPr lang="fr-FR"/>
           </a:p>
@@ -1236,7 +1241,7 @@
           <a:p>
             <a:fld id="{3251C5E9-4D7C-4F7F-8F09-6DF95D3E91D1}" type="datetimeFigureOut">
               <a:rPr lang="fr-FR" smtClean="0"/>
-              <a:t>09/04/2021</a:t>
+              <a:t>12/04/2021</a:t>
             </a:fld>
             <a:endParaRPr lang="fr-FR"/>
           </a:p>
@@ -1603,7 +1608,7 @@
           <a:p>
             <a:fld id="{3251C5E9-4D7C-4F7F-8F09-6DF95D3E91D1}" type="datetimeFigureOut">
               <a:rPr lang="fr-FR" smtClean="0"/>
-              <a:t>09/04/2021</a:t>
+              <a:t>12/04/2021</a:t>
             </a:fld>
             <a:endParaRPr lang="fr-FR"/>
           </a:p>
@@ -1721,7 +1726,7 @@
           <a:p>
             <a:fld id="{3251C5E9-4D7C-4F7F-8F09-6DF95D3E91D1}" type="datetimeFigureOut">
               <a:rPr lang="fr-FR" smtClean="0"/>
-              <a:t>09/04/2021</a:t>
+              <a:t>12/04/2021</a:t>
             </a:fld>
             <a:endParaRPr lang="fr-FR"/>
           </a:p>
@@ -1816,7 +1821,7 @@
           <a:p>
             <a:fld id="{3251C5E9-4D7C-4F7F-8F09-6DF95D3E91D1}" type="datetimeFigureOut">
               <a:rPr lang="fr-FR" smtClean="0"/>
-              <a:t>09/04/2021</a:t>
+              <a:t>12/04/2021</a:t>
             </a:fld>
             <a:endParaRPr lang="fr-FR"/>
           </a:p>
@@ -2093,7 +2098,7 @@
           <a:p>
             <a:fld id="{3251C5E9-4D7C-4F7F-8F09-6DF95D3E91D1}" type="datetimeFigureOut">
               <a:rPr lang="fr-FR" smtClean="0"/>
-              <a:t>09/04/2021</a:t>
+              <a:t>12/04/2021</a:t>
             </a:fld>
             <a:endParaRPr lang="fr-FR"/>
           </a:p>
@@ -2346,7 +2351,7 @@
           <a:p>
             <a:fld id="{3251C5E9-4D7C-4F7F-8F09-6DF95D3E91D1}" type="datetimeFigureOut">
               <a:rPr lang="fr-FR" smtClean="0"/>
-              <a:t>09/04/2021</a:t>
+              <a:t>12/04/2021</a:t>
             </a:fld>
             <a:endParaRPr lang="fr-FR"/>
           </a:p>
@@ -2559,7 +2564,7 @@
           <a:p>
             <a:fld id="{3251C5E9-4D7C-4F7F-8F09-6DF95D3E91D1}" type="datetimeFigureOut">
               <a:rPr lang="fr-FR" smtClean="0"/>
-              <a:t>09/04/2021</a:t>
+              <a:t>12/04/2021</a:t>
             </a:fld>
             <a:endParaRPr lang="fr-FR"/>
           </a:p>
@@ -2966,256 +2971,195 @@
       </p:grpSpPr>
       <p:grpSp>
         <p:nvGrpSpPr>
-          <p:cNvPr id="13" name="Groupe 12"/>
+          <p:cNvPr id="11" name="Groupe 10"/>
           <p:cNvGrpSpPr/>
           <p:nvPr/>
         </p:nvGrpSpPr>
         <p:grpSpPr>
           <a:xfrm>
-            <a:off x="216798" y="130545"/>
-            <a:ext cx="10919449" cy="6560434"/>
-            <a:chOff x="216798" y="130545"/>
-            <a:chExt cx="10919449" cy="6560434"/>
+            <a:off x="216799" y="130545"/>
+            <a:ext cx="10912932" cy="6560434"/>
+            <a:chOff x="216799" y="130545"/>
+            <a:chExt cx="10912932" cy="6560434"/>
           </a:xfrm>
         </p:grpSpPr>
-        <p:grpSp>
-          <p:nvGrpSpPr>
-            <p:cNvPr id="11" name="Groupe 10"/>
-            <p:cNvGrpSpPr/>
+        <p:pic>
+          <p:nvPicPr>
+            <p:cNvPr id="6" name="Image 5"/>
+            <p:cNvPicPr>
+              <a:picLocks noChangeAspect="1"/>
+            </p:cNvPicPr>
             <p:nvPr/>
-          </p:nvGrpSpPr>
-          <p:grpSpPr>
-            <a:xfrm>
-              <a:off x="216799" y="130545"/>
-              <a:ext cx="10919448" cy="6560434"/>
-              <a:chOff x="216799" y="130545"/>
-              <a:chExt cx="10919448" cy="6560434"/>
-            </a:xfrm>
-          </p:grpSpPr>
-          <p:pic>
-            <p:nvPicPr>
-              <p:cNvPr id="6" name="Image 5"/>
-              <p:cNvPicPr>
-                <a:picLocks noChangeAspect="1"/>
-              </p:cNvPicPr>
-              <p:nvPr/>
-            </p:nvPicPr>
-            <p:blipFill>
-              <a:blip r:embed="rId2">
-                <a:extLst>
-                  <a:ext uri="{28A0092B-C50C-407E-A947-70E740481C1C}">
-                    <a14:useLocalDpi xmlns:a14="http://schemas.microsoft.com/office/drawing/2010/main" val="0"/>
-                  </a:ext>
-                </a:extLst>
-              </a:blip>
-              <a:stretch>
-                <a:fillRect/>
-              </a:stretch>
-            </p:blipFill>
-            <p:spPr>
-              <a:xfrm>
-                <a:off x="220057" y="130545"/>
-                <a:ext cx="3524742" cy="4286848"/>
-              </a:xfrm>
-              <a:prstGeom prst="rect">
-                <a:avLst/>
-              </a:prstGeom>
-            </p:spPr>
-          </p:pic>
-          <p:pic>
-            <p:nvPicPr>
-              <p:cNvPr id="5" name="Image 4"/>
-              <p:cNvPicPr>
-                <a:picLocks noChangeAspect="1"/>
-              </p:cNvPicPr>
-              <p:nvPr/>
-            </p:nvPicPr>
-            <p:blipFill rotWithShape="1">
-              <a:blip r:embed="rId3" cstate="print">
-                <a:extLst>
-                  <a:ext uri="{28A0092B-C50C-407E-A947-70E740481C1C}">
-                    <a14:useLocalDpi xmlns:a14="http://schemas.microsoft.com/office/drawing/2010/main" val="0"/>
-                  </a:ext>
-                </a:extLst>
-              </a:blip>
-              <a:srcRect l="7083" t="22794" r="11250" b="24048"/>
-              <a:stretch/>
-            </p:blipFill>
-            <p:spPr>
-              <a:xfrm>
-                <a:off x="216799" y="3630979"/>
-                <a:ext cx="3528000" cy="3060000"/>
-              </a:xfrm>
-              <a:prstGeom prst="rect">
-                <a:avLst/>
-              </a:prstGeom>
-            </p:spPr>
-          </p:pic>
-          <p:pic>
-            <p:nvPicPr>
-              <p:cNvPr id="7" name="Image 6"/>
-              <p:cNvPicPr>
-                <a:picLocks noChangeAspect="1"/>
-              </p:cNvPicPr>
-              <p:nvPr/>
-            </p:nvPicPr>
-            <p:blipFill>
-              <a:blip r:embed="rId4">
-                <a:extLst>
-                  <a:ext uri="{28A0092B-C50C-407E-A947-70E740481C1C}">
-                    <a14:useLocalDpi xmlns:a14="http://schemas.microsoft.com/office/drawing/2010/main" val="0"/>
-                  </a:ext>
-                </a:extLst>
-              </a:blip>
-              <a:stretch>
-                <a:fillRect/>
-              </a:stretch>
-            </p:blipFill>
-            <p:spPr>
-              <a:xfrm>
-                <a:off x="3912523" y="130545"/>
-                <a:ext cx="3524742" cy="4286848"/>
-              </a:xfrm>
-              <a:prstGeom prst="rect">
-                <a:avLst/>
-              </a:prstGeom>
-            </p:spPr>
-          </p:pic>
-          <p:pic>
-            <p:nvPicPr>
-              <p:cNvPr id="8" name="Image 7"/>
-              <p:cNvPicPr>
-                <a:picLocks noChangeAspect="1"/>
-              </p:cNvPicPr>
-              <p:nvPr/>
-            </p:nvPicPr>
-            <p:blipFill rotWithShape="1">
-              <a:blip r:embed="rId5" cstate="print">
-                <a:extLst>
-                  <a:ext uri="{28A0092B-C50C-407E-A947-70E740481C1C}">
-                    <a14:useLocalDpi xmlns:a14="http://schemas.microsoft.com/office/drawing/2010/main" val="0"/>
-                  </a:ext>
-                </a:extLst>
-              </a:blip>
-              <a:srcRect l="22005" t="22445" r="9403" b="32939"/>
-              <a:stretch/>
-            </p:blipFill>
-            <p:spPr>
-              <a:xfrm>
-                <a:off x="3912523" y="3630979"/>
-                <a:ext cx="3528000" cy="3060000"/>
-              </a:xfrm>
-              <a:prstGeom prst="rect">
-                <a:avLst/>
-              </a:prstGeom>
-            </p:spPr>
-          </p:pic>
-          <p:pic>
-            <p:nvPicPr>
-              <p:cNvPr id="9" name="Image 8"/>
-              <p:cNvPicPr>
-                <a:picLocks noChangeAspect="1"/>
-              </p:cNvPicPr>
-              <p:nvPr/>
-            </p:nvPicPr>
-            <p:blipFill>
-              <a:blip r:embed="rId6">
-                <a:extLst>
-                  <a:ext uri="{28A0092B-C50C-407E-A947-70E740481C1C}">
-                    <a14:useLocalDpi xmlns:a14="http://schemas.microsoft.com/office/drawing/2010/main" val="0"/>
-                  </a:ext>
-                </a:extLst>
-              </a:blip>
-              <a:stretch>
-                <a:fillRect/>
-              </a:stretch>
-            </p:blipFill>
-            <p:spPr>
-              <a:xfrm>
-                <a:off x="7604989" y="130545"/>
-                <a:ext cx="3524742" cy="4286848"/>
-              </a:xfrm>
-              <a:prstGeom prst="rect">
-                <a:avLst/>
-              </a:prstGeom>
-            </p:spPr>
-          </p:pic>
-          <p:pic>
-            <p:nvPicPr>
-              <p:cNvPr id="10" name="Image 9"/>
-              <p:cNvPicPr>
-                <a:picLocks noChangeAspect="1"/>
-              </p:cNvPicPr>
-              <p:nvPr/>
-            </p:nvPicPr>
-            <p:blipFill rotWithShape="1">
-              <a:blip r:embed="rId7" cstate="print">
-                <a:extLst>
-                  <a:ext uri="{28A0092B-C50C-407E-A947-70E740481C1C}">
-                    <a14:useLocalDpi xmlns:a14="http://schemas.microsoft.com/office/drawing/2010/main" val="0"/>
-                  </a:ext>
-                </a:extLst>
-              </a:blip>
-              <a:srcRect l="9200" t="18345" r="12400" b="31359"/>
-              <a:stretch/>
-            </p:blipFill>
-            <p:spPr>
-              <a:xfrm>
-                <a:off x="7608247" y="3630979"/>
-                <a:ext cx="3528000" cy="3060000"/>
-              </a:xfrm>
-              <a:prstGeom prst="rect">
-                <a:avLst/>
-              </a:prstGeom>
-            </p:spPr>
-          </p:pic>
-        </p:grpSp>
-        <p:sp>
-          <p:nvSpPr>
-            <p:cNvPr id="12" name="Rectangle 11"/>
-            <p:cNvSpPr/>
-            <p:nvPr/>
-          </p:nvSpPr>
+          </p:nvPicPr>
+          <p:blipFill>
+            <a:blip r:embed="rId2">
+              <a:extLst>
+                <a:ext uri="{28A0092B-C50C-407E-A947-70E740481C1C}">
+                  <a14:useLocalDpi xmlns:a14="http://schemas.microsoft.com/office/drawing/2010/main" val="0"/>
+                </a:ext>
+              </a:extLst>
+            </a:blip>
+            <a:stretch>
+              <a:fillRect/>
+            </a:stretch>
+          </p:blipFill>
           <p:spPr>
             <a:xfrm>
-              <a:off x="216798" y="3585411"/>
-              <a:ext cx="10919449" cy="151446"/>
+              <a:off x="220057" y="130545"/>
+              <a:ext cx="3524742" cy="4286848"/>
             </a:xfrm>
             <a:prstGeom prst="rect">
               <a:avLst/>
             </a:prstGeom>
-            <a:solidFill>
-              <a:schemeClr val="bg1"/>
-            </a:solidFill>
-            <a:ln>
-              <a:noFill/>
-            </a:ln>
           </p:spPr>
-          <p:style>
-            <a:lnRef idx="2">
-              <a:schemeClr val="accent1">
-                <a:shade val="50000"/>
-              </a:schemeClr>
-            </a:lnRef>
-            <a:fillRef idx="1">
-              <a:schemeClr val="accent1"/>
-            </a:fillRef>
-            <a:effectRef idx="0">
-              <a:schemeClr val="accent1"/>
-            </a:effectRef>
-            <a:fontRef idx="minor">
-              <a:schemeClr val="lt1"/>
-            </a:fontRef>
-          </p:style>
-          <p:txBody>
-            <a:bodyPr rtlCol="0" anchor="ctr"/>
-            <a:lstStyle/>
-            <a:p>
-              <a:pPr algn="ctr"/>
-              <a:endParaRPr lang="fr-FR"/>
-            </a:p>
-          </p:txBody>
-        </p:sp>
+        </p:pic>
+        <p:pic>
+          <p:nvPicPr>
+            <p:cNvPr id="5" name="Image 4"/>
+            <p:cNvPicPr>
+              <a:picLocks noChangeAspect="1"/>
+            </p:cNvPicPr>
+            <p:nvPr/>
+          </p:nvPicPr>
+          <p:blipFill rotWithShape="1">
+            <a:blip r:embed="rId3" cstate="print">
+              <a:extLst>
+                <a:ext uri="{28A0092B-C50C-407E-A947-70E740481C1C}">
+                  <a14:useLocalDpi xmlns:a14="http://schemas.microsoft.com/office/drawing/2010/main" val="0"/>
+                </a:ext>
+              </a:extLst>
+            </a:blip>
+            <a:srcRect l="7083" t="22794" r="11250" b="24048"/>
+            <a:stretch/>
+          </p:blipFill>
+          <p:spPr>
+            <a:xfrm>
+              <a:off x="216799" y="3630979"/>
+              <a:ext cx="3528000" cy="3060000"/>
+            </a:xfrm>
+            <a:prstGeom prst="rect">
+              <a:avLst/>
+            </a:prstGeom>
+          </p:spPr>
+        </p:pic>
+        <p:pic>
+          <p:nvPicPr>
+            <p:cNvPr id="7" name="Image 6"/>
+            <p:cNvPicPr>
+              <a:picLocks noChangeAspect="1"/>
+            </p:cNvPicPr>
+            <p:nvPr/>
+          </p:nvPicPr>
+          <p:blipFill>
+            <a:blip r:embed="rId4">
+              <a:extLst>
+                <a:ext uri="{28A0092B-C50C-407E-A947-70E740481C1C}">
+                  <a14:useLocalDpi xmlns:a14="http://schemas.microsoft.com/office/drawing/2010/main" val="0"/>
+                </a:ext>
+              </a:extLst>
+            </a:blip>
+            <a:stretch>
+              <a:fillRect/>
+            </a:stretch>
+          </p:blipFill>
+          <p:spPr>
+            <a:xfrm>
+              <a:off x="3912523" y="130545"/>
+              <a:ext cx="3524742" cy="4286848"/>
+            </a:xfrm>
+            <a:prstGeom prst="rect">
+              <a:avLst/>
+            </a:prstGeom>
+          </p:spPr>
+        </p:pic>
+        <p:pic>
+          <p:nvPicPr>
+            <p:cNvPr id="8" name="Image 7"/>
+            <p:cNvPicPr>
+              <a:picLocks noChangeAspect="1"/>
+            </p:cNvPicPr>
+            <p:nvPr/>
+          </p:nvPicPr>
+          <p:blipFill rotWithShape="1">
+            <a:blip r:embed="rId5" cstate="print">
+              <a:extLst>
+                <a:ext uri="{28A0092B-C50C-407E-A947-70E740481C1C}">
+                  <a14:useLocalDpi xmlns:a14="http://schemas.microsoft.com/office/drawing/2010/main" val="0"/>
+                </a:ext>
+              </a:extLst>
+            </a:blip>
+            <a:srcRect l="22005" t="22445" r="9403" b="32939"/>
+            <a:stretch/>
+          </p:blipFill>
+          <p:spPr>
+            <a:xfrm>
+              <a:off x="3912523" y="3630979"/>
+              <a:ext cx="3524742" cy="3060000"/>
+            </a:xfrm>
+            <a:prstGeom prst="rect">
+              <a:avLst/>
+            </a:prstGeom>
+          </p:spPr>
+        </p:pic>
+        <p:pic>
+          <p:nvPicPr>
+            <p:cNvPr id="9" name="Image 8"/>
+            <p:cNvPicPr>
+              <a:picLocks noChangeAspect="1"/>
+            </p:cNvPicPr>
+            <p:nvPr/>
+          </p:nvPicPr>
+          <p:blipFill>
+            <a:blip r:embed="rId6">
+              <a:extLst>
+                <a:ext uri="{28A0092B-C50C-407E-A947-70E740481C1C}">
+                  <a14:useLocalDpi xmlns:a14="http://schemas.microsoft.com/office/drawing/2010/main" val="0"/>
+                </a:ext>
+              </a:extLst>
+            </a:blip>
+            <a:stretch>
+              <a:fillRect/>
+            </a:stretch>
+          </p:blipFill>
+          <p:spPr>
+            <a:xfrm>
+              <a:off x="7604989" y="130545"/>
+              <a:ext cx="3524742" cy="4286848"/>
+            </a:xfrm>
+            <a:prstGeom prst="rect">
+              <a:avLst/>
+            </a:prstGeom>
+          </p:spPr>
+        </p:pic>
+        <p:pic>
+          <p:nvPicPr>
+            <p:cNvPr id="10" name="Image 9"/>
+            <p:cNvPicPr>
+              <a:picLocks noChangeAspect="1"/>
+            </p:cNvPicPr>
+            <p:nvPr/>
+          </p:nvPicPr>
+          <p:blipFill rotWithShape="1">
+            <a:blip r:embed="rId7" cstate="print">
+              <a:extLst>
+                <a:ext uri="{28A0092B-C50C-407E-A947-70E740481C1C}">
+                  <a14:useLocalDpi xmlns:a14="http://schemas.microsoft.com/office/drawing/2010/main" val="0"/>
+                </a:ext>
+              </a:extLst>
+            </a:blip>
+            <a:srcRect l="9200" t="18345" r="12400" b="31359"/>
+            <a:stretch/>
+          </p:blipFill>
+          <p:spPr>
+            <a:xfrm>
+              <a:off x="7608247" y="3630979"/>
+              <a:ext cx="3521484" cy="3060000"/>
+            </a:xfrm>
+            <a:prstGeom prst="rect">
+              <a:avLst/>
+            </a:prstGeom>
+          </p:spPr>
+        </p:pic>
       </p:grpSp>
     </p:spTree>
     <p:extLst>

</xml_diff>